<commit_message>
update with model options
</commit_message>
<xml_diff>
--- a/Yarely-slides/SlideDeckGroup2.v1.pptx
+++ b/Yarely-slides/SlideDeckGroup2.v1.pptx
@@ -13,7 +13,8 @@
     <p:sldId id="266" r:id="rId7"/>
     <p:sldId id="262" r:id="rId8"/>
     <p:sldId id="283" r:id="rId9"/>
-    <p:sldId id="272" r:id="rId10"/>
+    <p:sldId id="284" r:id="rId10"/>
+    <p:sldId id="272" r:id="rId11"/>
   </p:sldIdLst>
   <p:sldSz cx="12192000" cy="6858000"/>
   <p:notesSz cx="6858000" cy="9144000"/>
@@ -3963,6 +3964,538 @@
 </p:sld>
 </file>
 
+<file path=ppt/slides/slide10.xml><?xml version="1.0" encoding="utf-8"?>
+<p:sld xmlns:a="http://schemas.openxmlformats.org/drawingml/2006/main" xmlns:r="http://schemas.openxmlformats.org/officeDocument/2006/relationships" xmlns:p="http://schemas.openxmlformats.org/presentationml/2006/main">
+  <p:cSld>
+    <p:bg>
+      <p:bgPr>
+        <a:solidFill>
+          <a:schemeClr val="bg1"/>
+        </a:solidFill>
+        <a:effectLst/>
+      </p:bgPr>
+    </p:bg>
+    <p:spTree>
+      <p:nvGrpSpPr>
+        <p:cNvPr id="1" name=""/>
+        <p:cNvGrpSpPr/>
+        <p:nvPr/>
+      </p:nvGrpSpPr>
+      <p:grpSpPr>
+        <a:xfrm>
+          <a:off x="0" y="0"/>
+          <a:ext cx="0" cy="0"/>
+          <a:chOff x="0" y="0"/>
+          <a:chExt cx="0" cy="0"/>
+        </a:xfrm>
+      </p:grpSpPr>
+      <p:pic>
+        <p:nvPicPr>
+          <p:cNvPr id="6" name="Picture 5">
+            <a:extLst>
+              <a:ext uri="{FF2B5EF4-FFF2-40B4-BE49-F238E27FC236}">
+                <a16:creationId xmlns:a16="http://schemas.microsoft.com/office/drawing/2014/main" id="{06AA3B00-07F5-4DB2-8B24-42EBE1063B23}"/>
+              </a:ext>
+            </a:extLst>
+          </p:cNvPr>
+          <p:cNvPicPr>
+            <a:picLocks noChangeAspect="1"/>
+          </p:cNvPicPr>
+          <p:nvPr/>
+        </p:nvPicPr>
+        <p:blipFill rotWithShape="1">
+          <a:blip r:embed="rId2"/>
+          <a:srcRect l="1149" t="6819" r="22638" b="-1"/>
+          <a:stretch/>
+        </p:blipFill>
+        <p:spPr>
+          <a:xfrm>
+            <a:off x="2562726" y="1"/>
+            <a:ext cx="9629274" cy="6857999"/>
+          </a:xfrm>
+          <a:prstGeom prst="rect">
+            <a:avLst/>
+          </a:prstGeom>
+        </p:spPr>
+      </p:pic>
+      <p:sp>
+        <p:nvSpPr>
+          <p:cNvPr id="47" name="Freeform: Shape 46">
+            <a:extLst>
+              <a:ext uri="{FF2B5EF4-FFF2-40B4-BE49-F238E27FC236}">
+                <a16:creationId xmlns:a16="http://schemas.microsoft.com/office/drawing/2014/main" id="{D928DD85-BB99-450D-A702-2683E0296282}"/>
+              </a:ext>
+              <a:ext uri="{C183D7F6-B498-43B3-948B-1728B52AA6E4}">
+                <adec:decorative xmlns:adec="http://schemas.microsoft.com/office/drawing/2017/decorative" val="1"/>
+              </a:ext>
+            </a:extLst>
+          </p:cNvPr>
+          <p:cNvSpPr>
+            <a:spLocks noGrp="1" noRot="1" noChangeAspect="1" noMove="1" noResize="1" noEditPoints="1" noAdjustHandles="1" noChangeArrowheads="1" noChangeShapeType="1" noTextEdit="1"/>
+          </p:cNvSpPr>
+          <p:nvPr>
+            <p:extLst>
+              <p:ext uri="{386F3935-93C4-4BCD-93E2-E3B085C9AB24}">
+                <p16:designElem xmlns:p16="http://schemas.microsoft.com/office/powerpoint/2015/main" val="1"/>
+              </p:ext>
+            </p:extLst>
+          </p:nvPr>
+        </p:nvSpPr>
+        <p:spPr>
+          <a:xfrm flipV="1">
+            <a:off x="0" y="-478"/>
+            <a:ext cx="6754318" cy="6858478"/>
+          </a:xfrm>
+          <a:custGeom>
+            <a:avLst/>
+            <a:gdLst>
+              <a:gd name="connsiteX0" fmla="*/ 0 w 6754318"/>
+              <a:gd name="connsiteY0" fmla="*/ 6858478 h 6858478"/>
+              <a:gd name="connsiteX1" fmla="*/ 6754318 w 6754318"/>
+              <a:gd name="connsiteY1" fmla="*/ 6858478 h 6858478"/>
+              <a:gd name="connsiteX2" fmla="*/ 3577943 w 6754318"/>
+              <a:gd name="connsiteY2" fmla="*/ 0 h 6858478"/>
+              <a:gd name="connsiteX3" fmla="*/ 3572366 w 6754318"/>
+              <a:gd name="connsiteY3" fmla="*/ 0 h 6858478"/>
+              <a:gd name="connsiteX4" fmla="*/ 2506138 w 6754318"/>
+              <a:gd name="connsiteY4" fmla="*/ 0 h 6858478"/>
+              <a:gd name="connsiteX5" fmla="*/ 0 w 6754318"/>
+              <a:gd name="connsiteY5" fmla="*/ 0 h 6858478"/>
+            </a:gdLst>
+            <a:ahLst/>
+            <a:cxnLst>
+              <a:cxn ang="0">
+                <a:pos x="connsiteX0" y="connsiteY0"/>
+              </a:cxn>
+              <a:cxn ang="0">
+                <a:pos x="connsiteX1" y="connsiteY1"/>
+              </a:cxn>
+              <a:cxn ang="0">
+                <a:pos x="connsiteX2" y="connsiteY2"/>
+              </a:cxn>
+              <a:cxn ang="0">
+                <a:pos x="connsiteX3" y="connsiteY3"/>
+              </a:cxn>
+              <a:cxn ang="0">
+                <a:pos x="connsiteX4" y="connsiteY4"/>
+              </a:cxn>
+              <a:cxn ang="0">
+                <a:pos x="connsiteX5" y="connsiteY5"/>
+              </a:cxn>
+            </a:cxnLst>
+            <a:rect l="l" t="t" r="r" b="b"/>
+            <a:pathLst>
+              <a:path w="6754318" h="6858478">
+                <a:moveTo>
+                  <a:pt x="0" y="6858478"/>
+                </a:moveTo>
+                <a:lnTo>
+                  <a:pt x="6754318" y="6858478"/>
+                </a:lnTo>
+                <a:lnTo>
+                  <a:pt x="3577943" y="0"/>
+                </a:lnTo>
+                <a:lnTo>
+                  <a:pt x="3572366" y="0"/>
+                </a:lnTo>
+                <a:lnTo>
+                  <a:pt x="2506138" y="0"/>
+                </a:lnTo>
+                <a:lnTo>
+                  <a:pt x="0" y="0"/>
+                </a:lnTo>
+                <a:close/>
+              </a:path>
+            </a:pathLst>
+          </a:custGeom>
+          <a:solidFill>
+            <a:schemeClr val="bg1">
+              <a:lumMod val="85000"/>
+              <a:lumOff val="15000"/>
+              <a:alpha val="70000"/>
+            </a:schemeClr>
+          </a:solidFill>
+          <a:ln>
+            <a:noFill/>
+          </a:ln>
+        </p:spPr>
+        <p:style>
+          <a:lnRef idx="2">
+            <a:schemeClr val="accent1">
+              <a:shade val="50000"/>
+            </a:schemeClr>
+          </a:lnRef>
+          <a:fillRef idx="1">
+            <a:schemeClr val="accent1"/>
+          </a:fillRef>
+          <a:effectRef idx="0">
+            <a:schemeClr val="accent1"/>
+          </a:effectRef>
+          <a:fontRef idx="minor">
+            <a:schemeClr val="lt1"/>
+          </a:fontRef>
+        </p:style>
+        <p:txBody>
+          <a:bodyPr wrap="square" rtlCol="0" anchor="ctr">
+            <a:noAutofit/>
+          </a:bodyPr>
+          <a:lstStyle/>
+          <a:p>
+            <a:pPr marL="0" marR="0" lvl="0" indent="0" algn="ctr" defTabSz="914400" rtl="0" eaLnBrk="1" fontAlgn="auto" latinLnBrk="0" hangingPunct="1">
+              <a:lnSpc>
+                <a:spcPct val="100000"/>
+              </a:lnSpc>
+              <a:spcBef>
+                <a:spcPts val="0"/>
+              </a:spcBef>
+              <a:spcAft>
+                <a:spcPts val="0"/>
+              </a:spcAft>
+              <a:buClrTx/>
+              <a:buSzTx/>
+              <a:buFontTx/>
+              <a:buNone/>
+              <a:tabLst/>
+              <a:defRPr/>
+            </a:pPr>
+            <a:endParaRPr kumimoji="0" lang="en-US" sz="1800" b="0" i="0" u="none" strike="noStrike" kern="1200" cap="none" spc="0" normalizeH="0" baseline="0" noProof="0">
+              <a:ln>
+                <a:noFill/>
+              </a:ln>
+              <a:solidFill>
+                <a:prstClr val="white"/>
+              </a:solidFill>
+              <a:effectLst/>
+              <a:uLnTx/>
+              <a:uFillTx/>
+              <a:latin typeface="Calibri" panose="020F0502020204030204"/>
+              <a:ea typeface="+mn-ea"/>
+              <a:cs typeface="+mn-cs"/>
+            </a:endParaRPr>
+          </a:p>
+        </p:txBody>
+      </p:sp>
+      <p:sp>
+        <p:nvSpPr>
+          <p:cNvPr id="49" name="Freeform: Shape 48">
+            <a:extLst>
+              <a:ext uri="{FF2B5EF4-FFF2-40B4-BE49-F238E27FC236}">
+                <a16:creationId xmlns:a16="http://schemas.microsoft.com/office/drawing/2014/main" id="{240E5BD2-4019-4012-A1AA-628900E659E9}"/>
+              </a:ext>
+              <a:ext uri="{C183D7F6-B498-43B3-948B-1728B52AA6E4}">
+                <adec:decorative xmlns:adec="http://schemas.microsoft.com/office/drawing/2017/decorative" val="1"/>
+              </a:ext>
+            </a:extLst>
+          </p:cNvPr>
+          <p:cNvSpPr>
+            <a:spLocks noGrp="1" noRot="1" noChangeAspect="1" noMove="1" noResize="1" noEditPoints="1" noAdjustHandles="1" noChangeArrowheads="1" noChangeShapeType="1" noTextEdit="1"/>
+          </p:cNvSpPr>
+          <p:nvPr>
+            <p:extLst>
+              <p:ext uri="{386F3935-93C4-4BCD-93E2-E3B085C9AB24}">
+                <p16:designElem xmlns:p16="http://schemas.microsoft.com/office/powerpoint/2015/main" val="1"/>
+              </p:ext>
+            </p:extLst>
+          </p:nvPr>
+        </p:nvSpPr>
+        <p:spPr>
+          <a:xfrm flipV="1">
+            <a:off x="1" y="-478"/>
+            <a:ext cx="5953780" cy="6858478"/>
+          </a:xfrm>
+          <a:custGeom>
+            <a:avLst/>
+            <a:gdLst>
+              <a:gd name="connsiteX0" fmla="*/ 0 w 5953780"/>
+              <a:gd name="connsiteY0" fmla="*/ 6858478 h 6858478"/>
+              <a:gd name="connsiteX1" fmla="*/ 5953780 w 5953780"/>
+              <a:gd name="connsiteY1" fmla="*/ 6858478 h 6858478"/>
+              <a:gd name="connsiteX2" fmla="*/ 2777405 w 5953780"/>
+              <a:gd name="connsiteY2" fmla="*/ 0 h 6858478"/>
+              <a:gd name="connsiteX3" fmla="*/ 2771828 w 5953780"/>
+              <a:gd name="connsiteY3" fmla="*/ 0 h 6858478"/>
+              <a:gd name="connsiteX4" fmla="*/ 1705600 w 5953780"/>
+              <a:gd name="connsiteY4" fmla="*/ 0 h 6858478"/>
+              <a:gd name="connsiteX5" fmla="*/ 0 w 5953780"/>
+              <a:gd name="connsiteY5" fmla="*/ 0 h 6858478"/>
+            </a:gdLst>
+            <a:ahLst/>
+            <a:cxnLst>
+              <a:cxn ang="0">
+                <a:pos x="connsiteX0" y="connsiteY0"/>
+              </a:cxn>
+              <a:cxn ang="0">
+                <a:pos x="connsiteX1" y="connsiteY1"/>
+              </a:cxn>
+              <a:cxn ang="0">
+                <a:pos x="connsiteX2" y="connsiteY2"/>
+              </a:cxn>
+              <a:cxn ang="0">
+                <a:pos x="connsiteX3" y="connsiteY3"/>
+              </a:cxn>
+              <a:cxn ang="0">
+                <a:pos x="connsiteX4" y="connsiteY4"/>
+              </a:cxn>
+              <a:cxn ang="0">
+                <a:pos x="connsiteX5" y="connsiteY5"/>
+              </a:cxn>
+            </a:cxnLst>
+            <a:rect l="l" t="t" r="r" b="b"/>
+            <a:pathLst>
+              <a:path w="5953780" h="6858478">
+                <a:moveTo>
+                  <a:pt x="0" y="6858478"/>
+                </a:moveTo>
+                <a:lnTo>
+                  <a:pt x="5953780" y="6858478"/>
+                </a:lnTo>
+                <a:lnTo>
+                  <a:pt x="2777405" y="0"/>
+                </a:lnTo>
+                <a:lnTo>
+                  <a:pt x="2771828" y="0"/>
+                </a:lnTo>
+                <a:lnTo>
+                  <a:pt x="1705600" y="0"/>
+                </a:lnTo>
+                <a:lnTo>
+                  <a:pt x="0" y="0"/>
+                </a:lnTo>
+                <a:close/>
+              </a:path>
+            </a:pathLst>
+          </a:custGeom>
+          <a:solidFill>
+            <a:schemeClr val="bg1">
+              <a:lumMod val="85000"/>
+              <a:lumOff val="15000"/>
+            </a:schemeClr>
+          </a:solidFill>
+          <a:ln>
+            <a:noFill/>
+          </a:ln>
+        </p:spPr>
+        <p:style>
+          <a:lnRef idx="2">
+            <a:schemeClr val="accent1">
+              <a:shade val="50000"/>
+            </a:schemeClr>
+          </a:lnRef>
+          <a:fillRef idx="1">
+            <a:schemeClr val="accent1"/>
+          </a:fillRef>
+          <a:effectRef idx="0">
+            <a:schemeClr val="accent1"/>
+          </a:effectRef>
+          <a:fontRef idx="minor">
+            <a:schemeClr val="lt1"/>
+          </a:fontRef>
+        </p:style>
+        <p:txBody>
+          <a:bodyPr wrap="square" rtlCol="0" anchor="ctr">
+            <a:noAutofit/>
+          </a:bodyPr>
+          <a:lstStyle/>
+          <a:p>
+            <a:pPr marL="0" marR="0" lvl="0" indent="0" algn="ctr" defTabSz="914400" rtl="0" eaLnBrk="1" fontAlgn="auto" latinLnBrk="0" hangingPunct="1">
+              <a:lnSpc>
+                <a:spcPct val="100000"/>
+              </a:lnSpc>
+              <a:spcBef>
+                <a:spcPts val="0"/>
+              </a:spcBef>
+              <a:spcAft>
+                <a:spcPts val="0"/>
+              </a:spcAft>
+              <a:buClrTx/>
+              <a:buSzTx/>
+              <a:buFontTx/>
+              <a:buNone/>
+              <a:tabLst/>
+              <a:defRPr/>
+            </a:pPr>
+            <a:endParaRPr kumimoji="0" lang="en-US" sz="1800" b="0" i="0" u="none" strike="noStrike" kern="1200" cap="none" spc="0" normalizeH="0" baseline="0" noProof="0">
+              <a:ln>
+                <a:noFill/>
+              </a:ln>
+              <a:solidFill>
+                <a:prstClr val="white"/>
+              </a:solidFill>
+              <a:effectLst/>
+              <a:uLnTx/>
+              <a:uFillTx/>
+              <a:latin typeface="Calibri" panose="020F0502020204030204"/>
+              <a:ea typeface="+mn-ea"/>
+              <a:cs typeface="+mn-cs"/>
+            </a:endParaRPr>
+          </a:p>
+        </p:txBody>
+      </p:sp>
+      <p:sp>
+        <p:nvSpPr>
+          <p:cNvPr id="5" name="Title 4">
+            <a:extLst>
+              <a:ext uri="{FF2B5EF4-FFF2-40B4-BE49-F238E27FC236}">
+                <a16:creationId xmlns:a16="http://schemas.microsoft.com/office/drawing/2014/main" id="{7BCFFD7F-EA8C-4208-8932-DC9E8F1DD44D}"/>
+              </a:ext>
+            </a:extLst>
+          </p:cNvPr>
+          <p:cNvSpPr>
+            <a:spLocks noGrp="1"/>
+          </p:cNvSpPr>
+          <p:nvPr>
+            <p:ph type="title"/>
+          </p:nvPr>
+        </p:nvSpPr>
+        <p:spPr>
+          <a:xfrm>
+            <a:off x="804672" y="342006"/>
+            <a:ext cx="3879232" cy="2248122"/>
+          </a:xfrm>
+        </p:spPr>
+        <p:txBody>
+          <a:bodyPr vert="horz" lIns="91440" tIns="45720" rIns="91440" bIns="45720" rtlCol="0" anchor="b">
+            <a:normAutofit/>
+          </a:bodyPr>
+          <a:lstStyle/>
+          <a:p>
+            <a:r>
+              <a:rPr lang="en-US" sz="5400" b="1" dirty="0"/>
+              <a:t>Thank You!</a:t>
+            </a:r>
+          </a:p>
+        </p:txBody>
+      </p:sp>
+      <p:sp>
+        <p:nvSpPr>
+          <p:cNvPr id="3" name="Text Placeholder 2">
+            <a:extLst>
+              <a:ext uri="{FF2B5EF4-FFF2-40B4-BE49-F238E27FC236}">
+                <a16:creationId xmlns:a16="http://schemas.microsoft.com/office/drawing/2014/main" id="{CD9A2A57-4007-41B1-9BB7-1A54BBFF536A}"/>
+              </a:ext>
+            </a:extLst>
+          </p:cNvPr>
+          <p:cNvSpPr>
+            <a:spLocks noGrp="1"/>
+          </p:cNvSpPr>
+          <p:nvPr>
+            <p:ph type="body" idx="1"/>
+          </p:nvPr>
+        </p:nvSpPr>
+        <p:spPr>
+          <a:xfrm>
+            <a:off x="804672" y="2726652"/>
+            <a:ext cx="3205463" cy="1155525"/>
+          </a:xfrm>
+        </p:spPr>
+        <p:txBody>
+          <a:bodyPr vert="horz" lIns="91440" tIns="45720" rIns="91440" bIns="45720" rtlCol="0" anchor="t">
+            <a:normAutofit/>
+          </a:bodyPr>
+          <a:lstStyle/>
+          <a:p>
+            <a:r>
+              <a:rPr lang="en-US" sz="2000">
+                <a:solidFill>
+                  <a:schemeClr val="tx1"/>
+                </a:solidFill>
+              </a:rPr>
+              <a:t>Q &amp; A</a:t>
+            </a:r>
+          </a:p>
+        </p:txBody>
+      </p:sp>
+      <p:cxnSp>
+        <p:nvCxnSpPr>
+          <p:cNvPr id="8" name="Straight Connector 7">
+            <a:extLst>
+              <a:ext uri="{FF2B5EF4-FFF2-40B4-BE49-F238E27FC236}">
+                <a16:creationId xmlns:a16="http://schemas.microsoft.com/office/drawing/2014/main" id="{365706AE-0F48-4687-B860-1AD7CA9D68FD}"/>
+              </a:ext>
+            </a:extLst>
+          </p:cNvPr>
+          <p:cNvCxnSpPr/>
+          <p:nvPr/>
+        </p:nvCxnSpPr>
+        <p:spPr>
+          <a:xfrm flipH="1">
+            <a:off x="2756647" y="-478"/>
+            <a:ext cx="3197134" cy="6858478"/>
+          </a:xfrm>
+          <a:prstGeom prst="line">
+            <a:avLst/>
+          </a:prstGeom>
+          <a:ln>
+            <a:solidFill>
+              <a:srgbClr val="FF0000"/>
+            </a:solidFill>
+          </a:ln>
+        </p:spPr>
+        <p:style>
+          <a:lnRef idx="1">
+            <a:schemeClr val="accent1"/>
+          </a:lnRef>
+          <a:fillRef idx="0">
+            <a:schemeClr val="accent1"/>
+          </a:fillRef>
+          <a:effectRef idx="0">
+            <a:schemeClr val="accent1"/>
+          </a:effectRef>
+          <a:fontRef idx="minor">
+            <a:schemeClr val="tx1"/>
+          </a:fontRef>
+        </p:style>
+      </p:cxnSp>
+      <p:cxnSp>
+        <p:nvCxnSpPr>
+          <p:cNvPr id="25" name="Straight Connector 24">
+            <a:extLst>
+              <a:ext uri="{FF2B5EF4-FFF2-40B4-BE49-F238E27FC236}">
+                <a16:creationId xmlns:a16="http://schemas.microsoft.com/office/drawing/2014/main" id="{1164EF5C-B64D-46E7-BE6C-55DD7627DFE2}"/>
+              </a:ext>
+            </a:extLst>
+          </p:cNvPr>
+          <p:cNvCxnSpPr/>
+          <p:nvPr/>
+        </p:nvCxnSpPr>
+        <p:spPr>
+          <a:xfrm flipH="1">
+            <a:off x="3557184" y="0"/>
+            <a:ext cx="3197134" cy="6858478"/>
+          </a:xfrm>
+          <a:prstGeom prst="line">
+            <a:avLst/>
+          </a:prstGeom>
+          <a:ln/>
+        </p:spPr>
+        <p:style>
+          <a:lnRef idx="1">
+            <a:schemeClr val="accent1"/>
+          </a:lnRef>
+          <a:fillRef idx="0">
+            <a:schemeClr val="accent1"/>
+          </a:fillRef>
+          <a:effectRef idx="0">
+            <a:schemeClr val="accent1"/>
+          </a:effectRef>
+          <a:fontRef idx="minor">
+            <a:schemeClr val="tx1"/>
+          </a:fontRef>
+        </p:style>
+      </p:cxnSp>
+    </p:spTree>
+    <p:extLst>
+      <p:ext uri="{BB962C8B-B14F-4D97-AF65-F5344CB8AC3E}">
+        <p14:creationId xmlns:p14="http://schemas.microsoft.com/office/powerpoint/2010/main" val="1499255396"/>
+      </p:ext>
+    </p:extLst>
+  </p:cSld>
+  <p:clrMapOvr>
+    <a:overrideClrMapping bg1="dk1" tx1="lt1" bg2="dk2" tx2="lt2" accent1="accent1" accent2="accent2" accent3="accent3" accent4="accent4" accent5="accent5" accent6="accent6" hlink="hlink" folHlink="folHlink"/>
+  </p:clrMapOvr>
+</p:sld>
+</file>
+
 <file path=ppt/slides/slide2.xml><?xml version="1.0" encoding="utf-8"?>
 <p:sld xmlns:a="http://schemas.openxmlformats.org/drawingml/2006/main" xmlns:r="http://schemas.openxmlformats.org/officeDocument/2006/relationships" xmlns:p="http://schemas.openxmlformats.org/presentationml/2006/main">
   <p:cSld>
@@ -4579,110 +5112,50 @@
           </p:spPr>
         </p:pic>
       </p:grpSp>
-      <p:grpSp>
-        <p:nvGrpSpPr>
-          <p:cNvPr id="33" name="Group 32">
-            <a:extLst>
-              <a:ext uri="{FF2B5EF4-FFF2-40B4-BE49-F238E27FC236}">
-                <a16:creationId xmlns:a16="http://schemas.microsoft.com/office/drawing/2014/main" id="{1671B9EB-C82A-44B7-B60B-4B4C3E932C7F}"/>
-              </a:ext>
-            </a:extLst>
-          </p:cNvPr>
-          <p:cNvGrpSpPr/>
+      <p:sp>
+        <p:nvSpPr>
+          <p:cNvPr id="18" name="TextBox 17">
+            <a:extLst>
+              <a:ext uri="{FF2B5EF4-FFF2-40B4-BE49-F238E27FC236}">
+                <a16:creationId xmlns:a16="http://schemas.microsoft.com/office/drawing/2014/main" id="{30773E98-7CEF-4A52-AF55-B3A7715DAC14}"/>
+              </a:ext>
+            </a:extLst>
+          </p:cNvPr>
+          <p:cNvSpPr txBox="1"/>
           <p:nvPr/>
-        </p:nvGrpSpPr>
-        <p:grpSpPr>
+        </p:nvSpPr>
+        <p:spPr>
           <a:xfrm>
-            <a:off x="5067142" y="4905082"/>
-            <a:ext cx="2274846" cy="901894"/>
-            <a:chOff x="5091364" y="4673966"/>
-            <a:chExt cx="2274846" cy="901894"/>
-          </a:xfrm>
-        </p:grpSpPr>
-        <p:sp>
-          <p:nvSpPr>
-            <p:cNvPr id="18" name="TextBox 17">
-              <a:extLst>
-                <a:ext uri="{FF2B5EF4-FFF2-40B4-BE49-F238E27FC236}">
-                  <a16:creationId xmlns:a16="http://schemas.microsoft.com/office/drawing/2014/main" id="{30773E98-7CEF-4A52-AF55-B3A7715DAC14}"/>
-                </a:ext>
-              </a:extLst>
-            </p:cNvPr>
-            <p:cNvSpPr txBox="1"/>
-            <p:nvPr/>
-          </p:nvSpPr>
-          <p:spPr>
-            <a:xfrm>
-              <a:off x="5987786" y="4744863"/>
-              <a:ext cx="1378424" cy="830997"/>
-            </a:xfrm>
-            <a:prstGeom prst="rect">
-              <a:avLst/>
-            </a:prstGeom>
-            <a:noFill/>
-          </p:spPr>
-          <p:txBody>
-            <a:bodyPr wrap="square" rtlCol="0">
-              <a:spAutoFit/>
-            </a:bodyPr>
-            <a:lstStyle/>
-            <a:p>
-              <a:r>
-                <a:rPr lang="en-US" sz="2400" dirty="0">
-                  <a:latin typeface="Arial" panose="020B0604020202020204" pitchFamily="34" charset="0"/>
-                  <a:cs typeface="Arial" panose="020B0604020202020204" pitchFamily="34" charset="0"/>
-                </a:rPr>
-                <a:t>Q&amp;A</a:t>
-              </a:r>
-            </a:p>
-            <a:p>
-              <a:endParaRPr lang="en-US" sz="2400" dirty="0">
+            <a:off x="6552475" y="5733188"/>
+            <a:ext cx="1378424" cy="830997"/>
+          </a:xfrm>
+          <a:prstGeom prst="rect">
+            <a:avLst/>
+          </a:prstGeom>
+          <a:noFill/>
+        </p:spPr>
+        <p:txBody>
+          <a:bodyPr wrap="square" rtlCol="0">
+            <a:spAutoFit/>
+          </a:bodyPr>
+          <a:lstStyle/>
+          <a:p>
+            <a:r>
+              <a:rPr lang="en-US" sz="2400" dirty="0">
                 <a:latin typeface="Arial" panose="020B0604020202020204" pitchFamily="34" charset="0"/>
                 <a:cs typeface="Arial" panose="020B0604020202020204" pitchFamily="34" charset="0"/>
-              </a:endParaRPr>
-            </a:p>
-          </p:txBody>
-        </p:sp>
-        <p:pic>
-          <p:nvPicPr>
-            <p:cNvPr id="28" name="Graphic 27" descr="Badge 5 with solid fill">
-              <a:extLst>
-                <a:ext uri="{FF2B5EF4-FFF2-40B4-BE49-F238E27FC236}">
-                  <a16:creationId xmlns:a16="http://schemas.microsoft.com/office/drawing/2014/main" id="{13D65DF8-7D48-4FB6-9327-1501C53A3126}"/>
-                </a:ext>
-              </a:extLst>
-            </p:cNvPr>
-            <p:cNvPicPr>
-              <a:picLocks noChangeAspect="1"/>
-            </p:cNvPicPr>
-            <p:nvPr/>
-          </p:nvPicPr>
-          <p:blipFill>
-            <a:blip r:embed="rId12">
-              <a:extLst>
-                <a:ext uri="{28A0092B-C50C-407E-A947-70E740481C1C}">
-                  <a14:useLocalDpi xmlns:a14="http://schemas.microsoft.com/office/drawing/2010/main" val="0"/>
-                </a:ext>
-                <a:ext uri="{96DAC541-7B7A-43D3-8B79-37D633B846F1}">
-                  <asvg:svgBlip xmlns:asvg="http://schemas.microsoft.com/office/drawing/2016/SVG/main" r:embed="rId13"/>
-                </a:ext>
-              </a:extLst>
-            </a:blip>
-            <a:stretch>
-              <a:fillRect/>
-            </a:stretch>
-          </p:blipFill>
-          <p:spPr>
-            <a:xfrm>
-              <a:off x="5091364" y="4673966"/>
-              <a:ext cx="603504" cy="603504"/>
-            </a:xfrm>
-            <a:prstGeom prst="rect">
-              <a:avLst/>
-            </a:prstGeom>
-          </p:spPr>
-        </p:pic>
-      </p:grpSp>
+              </a:rPr>
+              <a:t>Q&amp;A</a:t>
+            </a:r>
+          </a:p>
+          <a:p>
+            <a:endParaRPr lang="en-US" sz="2400" dirty="0">
+              <a:latin typeface="Arial" panose="020B0604020202020204" pitchFamily="34" charset="0"/>
+              <a:cs typeface="Arial" panose="020B0604020202020204" pitchFamily="34" charset="0"/>
+            </a:endParaRPr>
+          </a:p>
+        </p:txBody>
+      </p:sp>
       <p:cxnSp>
         <p:nvCxnSpPr>
           <p:cNvPr id="75" name="Straight Connector 74">
@@ -4805,6 +5278,149 @@
           </a:fontRef>
         </p:style>
       </p:cxnSp>
+      <p:grpSp>
+        <p:nvGrpSpPr>
+          <p:cNvPr id="27" name="Group 26">
+            <a:extLst>
+              <a:ext uri="{FF2B5EF4-FFF2-40B4-BE49-F238E27FC236}">
+                <a16:creationId xmlns:a16="http://schemas.microsoft.com/office/drawing/2014/main" id="{50692F0D-5554-4A61-9861-8DCC47E03B2C}"/>
+              </a:ext>
+            </a:extLst>
+          </p:cNvPr>
+          <p:cNvGrpSpPr/>
+          <p:nvPr/>
+        </p:nvGrpSpPr>
+        <p:grpSpPr>
+          <a:xfrm>
+            <a:off x="5119822" y="4938648"/>
+            <a:ext cx="2951734" cy="834998"/>
+            <a:chOff x="5089052" y="4740862"/>
+            <a:chExt cx="2951734" cy="834998"/>
+          </a:xfrm>
+        </p:grpSpPr>
+        <p:sp>
+          <p:nvSpPr>
+            <p:cNvPr id="34" name="TextBox 33">
+              <a:extLst>
+                <a:ext uri="{FF2B5EF4-FFF2-40B4-BE49-F238E27FC236}">
+                  <a16:creationId xmlns:a16="http://schemas.microsoft.com/office/drawing/2014/main" id="{331C8CEA-571E-4DBD-AA6B-6603E1F9D20C}"/>
+                </a:ext>
+              </a:extLst>
+            </p:cNvPr>
+            <p:cNvSpPr txBox="1"/>
+            <p:nvPr/>
+          </p:nvSpPr>
+          <p:spPr>
+            <a:xfrm>
+              <a:off x="5987786" y="4744863"/>
+              <a:ext cx="2053000" cy="830997"/>
+            </a:xfrm>
+            <a:prstGeom prst="rect">
+              <a:avLst/>
+            </a:prstGeom>
+            <a:noFill/>
+          </p:spPr>
+          <p:txBody>
+            <a:bodyPr wrap="square" rtlCol="0">
+              <a:spAutoFit/>
+            </a:bodyPr>
+            <a:lstStyle/>
+            <a:p>
+              <a:r>
+                <a:rPr lang="en-US" sz="2400" dirty="0">
+                  <a:latin typeface="Arial" panose="020B0604020202020204" pitchFamily="34" charset="0"/>
+                  <a:cs typeface="Arial" panose="020B0604020202020204" pitchFamily="34" charset="0"/>
+                </a:rPr>
+                <a:t>Predictions</a:t>
+              </a:r>
+            </a:p>
+            <a:p>
+              <a:endParaRPr lang="en-US" sz="2400" dirty="0">
+                <a:latin typeface="Arial" panose="020B0604020202020204" pitchFamily="34" charset="0"/>
+                <a:cs typeface="Arial" panose="020B0604020202020204" pitchFamily="34" charset="0"/>
+              </a:endParaRPr>
+            </a:p>
+          </p:txBody>
+        </p:sp>
+        <p:pic>
+          <p:nvPicPr>
+            <p:cNvPr id="35" name="Graphic 34" descr="Badge 5 with solid fill">
+              <a:extLst>
+                <a:ext uri="{FF2B5EF4-FFF2-40B4-BE49-F238E27FC236}">
+                  <a16:creationId xmlns:a16="http://schemas.microsoft.com/office/drawing/2014/main" id="{1764E554-6B79-4451-95A6-75384D3B18BD}"/>
+                </a:ext>
+              </a:extLst>
+            </p:cNvPr>
+            <p:cNvPicPr>
+              <a:picLocks noChangeAspect="1"/>
+            </p:cNvPicPr>
+            <p:nvPr/>
+          </p:nvPicPr>
+          <p:blipFill>
+            <a:blip r:embed="rId12">
+              <a:extLst>
+                <a:ext uri="{28A0092B-C50C-407E-A947-70E740481C1C}">
+                  <a14:useLocalDpi xmlns:a14="http://schemas.microsoft.com/office/drawing/2010/main" val="0"/>
+                </a:ext>
+                <a:ext uri="{96DAC541-7B7A-43D3-8B79-37D633B846F1}">
+                  <asvg:svgBlip xmlns:asvg="http://schemas.microsoft.com/office/drawing/2016/SVG/main" r:embed="rId13"/>
+                </a:ext>
+              </a:extLst>
+            </a:blip>
+            <a:stretch>
+              <a:fillRect/>
+            </a:stretch>
+          </p:blipFill>
+          <p:spPr>
+            <a:xfrm>
+              <a:off x="5089052" y="4740862"/>
+              <a:ext cx="603504" cy="603504"/>
+            </a:xfrm>
+            <a:prstGeom prst="rect">
+              <a:avLst/>
+            </a:prstGeom>
+          </p:spPr>
+        </p:pic>
+      </p:grpSp>
+      <p:pic>
+        <p:nvPicPr>
+          <p:cNvPr id="3" name="Graphic 2" descr="Badge 6 with solid fill">
+            <a:extLst>
+              <a:ext uri="{FF2B5EF4-FFF2-40B4-BE49-F238E27FC236}">
+                <a16:creationId xmlns:a16="http://schemas.microsoft.com/office/drawing/2014/main" id="{64E9F391-47EA-4A09-B13A-1CB500E0336F}"/>
+              </a:ext>
+            </a:extLst>
+          </p:cNvPr>
+          <p:cNvPicPr>
+            <a:picLocks noChangeAspect="1"/>
+          </p:cNvPicPr>
+          <p:nvPr/>
+        </p:nvPicPr>
+        <p:blipFill>
+          <a:blip r:embed="rId14">
+            <a:extLst>
+              <a:ext uri="{28A0092B-C50C-407E-A947-70E740481C1C}">
+                <a14:useLocalDpi xmlns:a14="http://schemas.microsoft.com/office/drawing/2010/main" val="0"/>
+              </a:ext>
+              <a:ext uri="{96DAC541-7B7A-43D3-8B79-37D633B846F1}">
+                <asvg:svgBlip xmlns:asvg="http://schemas.microsoft.com/office/drawing/2016/SVG/main" r:embed="rId15"/>
+              </a:ext>
+            </a:extLst>
+          </a:blip>
+          <a:stretch>
+            <a:fillRect/>
+          </a:stretch>
+        </p:blipFill>
+        <p:spPr>
+          <a:xfrm>
+            <a:off x="5715502" y="5733188"/>
+            <a:ext cx="603504" cy="603504"/>
+          </a:xfrm>
+          <a:prstGeom prst="rect">
+            <a:avLst/>
+          </a:prstGeom>
+        </p:spPr>
+      </p:pic>
     </p:spTree>
     <p:extLst>
       <p:ext uri="{BB962C8B-B14F-4D97-AF65-F5344CB8AC3E}">
@@ -8492,49 +9108,6 @@
           </a:p>
         </p:txBody>
       </p:sp>
-      <p:cxnSp>
-        <p:nvCxnSpPr>
-          <p:cNvPr id="11" name="Straight Connector 10">
-            <a:extLst>
-              <a:ext uri="{FF2B5EF4-FFF2-40B4-BE49-F238E27FC236}">
-                <a16:creationId xmlns:a16="http://schemas.microsoft.com/office/drawing/2014/main" id="{2CD8C99B-B602-4538-A53F-C8034A9A5CAD}"/>
-              </a:ext>
-            </a:extLst>
-          </p:cNvPr>
-          <p:cNvCxnSpPr>
-            <a:cxnSpLocks/>
-          </p:cNvCxnSpPr>
-          <p:nvPr/>
-        </p:nvCxnSpPr>
-        <p:spPr>
-          <a:xfrm>
-            <a:off x="6196083" y="999629"/>
-            <a:ext cx="2524836" cy="0"/>
-          </a:xfrm>
-          <a:prstGeom prst="line">
-            <a:avLst/>
-          </a:prstGeom>
-          <a:ln w="25400" cmpd="sng">
-            <a:solidFill>
-              <a:srgbClr val="EB0A1E"/>
-            </a:solidFill>
-          </a:ln>
-        </p:spPr>
-        <p:style>
-          <a:lnRef idx="3">
-            <a:schemeClr val="accent2"/>
-          </a:lnRef>
-          <a:fillRef idx="0">
-            <a:schemeClr val="accent2"/>
-          </a:fillRef>
-          <a:effectRef idx="2">
-            <a:schemeClr val="accent2"/>
-          </a:effectRef>
-          <a:fontRef idx="minor">
-            <a:schemeClr val="tx1"/>
-          </a:fontRef>
-        </p:style>
-      </p:cxnSp>
       <p:sp>
         <p:nvSpPr>
           <p:cNvPr id="5" name="Rectangle 4">
@@ -9085,6 +9658,49 @@
           </p:cxnSp>
         </p:grpSp>
       </p:grpSp>
+      <p:cxnSp>
+        <p:nvCxnSpPr>
+          <p:cNvPr id="24" name="Straight Connector 23">
+            <a:extLst>
+              <a:ext uri="{FF2B5EF4-FFF2-40B4-BE49-F238E27FC236}">
+                <a16:creationId xmlns:a16="http://schemas.microsoft.com/office/drawing/2014/main" id="{30E78280-02E4-4411-86D2-9BE4671759B5}"/>
+              </a:ext>
+            </a:extLst>
+          </p:cNvPr>
+          <p:cNvCxnSpPr>
+            <a:cxnSpLocks/>
+          </p:cNvCxnSpPr>
+          <p:nvPr/>
+        </p:nvCxnSpPr>
+        <p:spPr>
+          <a:xfrm>
+            <a:off x="6196083" y="999629"/>
+            <a:ext cx="2524836" cy="0"/>
+          </a:xfrm>
+          <a:prstGeom prst="line">
+            <a:avLst/>
+          </a:prstGeom>
+          <a:ln w="25400" cmpd="sng">
+            <a:solidFill>
+              <a:srgbClr val="EB0A1E"/>
+            </a:solidFill>
+          </a:ln>
+        </p:spPr>
+        <p:style>
+          <a:lnRef idx="3">
+            <a:schemeClr val="accent2"/>
+          </a:lnRef>
+          <a:fillRef idx="0">
+            <a:schemeClr val="accent2"/>
+          </a:fillRef>
+          <a:effectRef idx="2">
+            <a:schemeClr val="accent2"/>
+          </a:effectRef>
+          <a:fontRef idx="minor">
+            <a:schemeClr val="tx1"/>
+          </a:fontRef>
+        </p:style>
+      </p:cxnSp>
     </p:spTree>
     <p:extLst>
       <p:ext uri="{BB962C8B-B14F-4D97-AF65-F5344CB8AC3E}">
@@ -9103,9 +9719,15 @@
   <p:cSld>
     <p:bg>
       <p:bgPr>
-        <a:solidFill>
-          <a:schemeClr val="bg1"/>
-        </a:solidFill>
+        <a:blipFill dpi="0" rotWithShape="1">
+          <a:blip r:embed="rId2">
+            <a:lum/>
+          </a:blip>
+          <a:srcRect/>
+          <a:stretch>
+            <a:fillRect l="-31000" r="-31000"/>
+          </a:stretch>
+        </a:blipFill>
         <a:effectLst/>
       </p:bgPr>
     </p:bg>
@@ -9123,41 +9745,12 @@
           <a:chExt cx="0" cy="0"/>
         </a:xfrm>
       </p:grpSpPr>
-      <p:pic>
-        <p:nvPicPr>
-          <p:cNvPr id="6" name="Picture 5">
-            <a:extLst>
-              <a:ext uri="{FF2B5EF4-FFF2-40B4-BE49-F238E27FC236}">
-                <a16:creationId xmlns:a16="http://schemas.microsoft.com/office/drawing/2014/main" id="{06AA3B00-07F5-4DB2-8B24-42EBE1063B23}"/>
-              </a:ext>
-            </a:extLst>
-          </p:cNvPr>
-          <p:cNvPicPr>
-            <a:picLocks noChangeAspect="1"/>
-          </p:cNvPicPr>
-          <p:nvPr/>
-        </p:nvPicPr>
-        <p:blipFill rotWithShape="1">
-          <a:blip r:embed="rId2"/>
-          <a:srcRect l="1149" t="6819" r="22638" b="-1"/>
-          <a:stretch/>
-        </p:blipFill>
-        <p:spPr>
-          <a:xfrm>
-            <a:off x="2562726" y="1"/>
-            <a:ext cx="9629274" cy="6857999"/>
-          </a:xfrm>
-          <a:prstGeom prst="rect">
-            <a:avLst/>
-          </a:prstGeom>
-        </p:spPr>
-      </p:pic>
-      <p:sp>
-        <p:nvSpPr>
-          <p:cNvPr id="47" name="Freeform: Shape 46">
-            <a:extLst>
-              <a:ext uri="{FF2B5EF4-FFF2-40B4-BE49-F238E27FC236}">
-                <a16:creationId xmlns:a16="http://schemas.microsoft.com/office/drawing/2014/main" id="{D928DD85-BB99-450D-A702-2683E0296282}"/>
+      <p:sp>
+        <p:nvSpPr>
+          <p:cNvPr id="9" name="Rectangle 8">
+            <a:extLst>
+              <a:ext uri="{FF2B5EF4-FFF2-40B4-BE49-F238E27FC236}">
+                <a16:creationId xmlns:a16="http://schemas.microsoft.com/office/drawing/2014/main" id="{9228552E-C8B1-4A80-8448-0787CE0FC704}"/>
               </a:ext>
               <a:ext uri="{C183D7F6-B498-43B3-948B-1728B52AA6E4}">
                 <adec:decorative xmlns:adec="http://schemas.microsoft.com/office/drawing/2017/decorative" val="1"/>
@@ -9176,78 +9769,15 @@
           </p:nvPr>
         </p:nvSpPr>
         <p:spPr>
-          <a:xfrm flipV="1">
-            <a:off x="0" y="-478"/>
-            <a:ext cx="6754318" cy="6858478"/>
-          </a:xfrm>
-          <a:custGeom>
+          <a:xfrm>
+            <a:off x="0" y="0"/>
+            <a:ext cx="12192000" cy="6858000"/>
+          </a:xfrm>
+          <a:prstGeom prst="rect">
             <a:avLst/>
-            <a:gdLst>
-              <a:gd name="connsiteX0" fmla="*/ 0 w 6754318"/>
-              <a:gd name="connsiteY0" fmla="*/ 6858478 h 6858478"/>
-              <a:gd name="connsiteX1" fmla="*/ 6754318 w 6754318"/>
-              <a:gd name="connsiteY1" fmla="*/ 6858478 h 6858478"/>
-              <a:gd name="connsiteX2" fmla="*/ 3577943 w 6754318"/>
-              <a:gd name="connsiteY2" fmla="*/ 0 h 6858478"/>
-              <a:gd name="connsiteX3" fmla="*/ 3572366 w 6754318"/>
-              <a:gd name="connsiteY3" fmla="*/ 0 h 6858478"/>
-              <a:gd name="connsiteX4" fmla="*/ 2506138 w 6754318"/>
-              <a:gd name="connsiteY4" fmla="*/ 0 h 6858478"/>
-              <a:gd name="connsiteX5" fmla="*/ 0 w 6754318"/>
-              <a:gd name="connsiteY5" fmla="*/ 0 h 6858478"/>
-            </a:gdLst>
-            <a:ahLst/>
-            <a:cxnLst>
-              <a:cxn ang="0">
-                <a:pos x="connsiteX0" y="connsiteY0"/>
-              </a:cxn>
-              <a:cxn ang="0">
-                <a:pos x="connsiteX1" y="connsiteY1"/>
-              </a:cxn>
-              <a:cxn ang="0">
-                <a:pos x="connsiteX2" y="connsiteY2"/>
-              </a:cxn>
-              <a:cxn ang="0">
-                <a:pos x="connsiteX3" y="connsiteY3"/>
-              </a:cxn>
-              <a:cxn ang="0">
-                <a:pos x="connsiteX4" y="connsiteY4"/>
-              </a:cxn>
-              <a:cxn ang="0">
-                <a:pos x="connsiteX5" y="connsiteY5"/>
-              </a:cxn>
-            </a:cxnLst>
-            <a:rect l="l" t="t" r="r" b="b"/>
-            <a:pathLst>
-              <a:path w="6754318" h="6858478">
-                <a:moveTo>
-                  <a:pt x="0" y="6858478"/>
-                </a:moveTo>
-                <a:lnTo>
-                  <a:pt x="6754318" y="6858478"/>
-                </a:lnTo>
-                <a:lnTo>
-                  <a:pt x="3577943" y="0"/>
-                </a:lnTo>
-                <a:lnTo>
-                  <a:pt x="3572366" y="0"/>
-                </a:lnTo>
-                <a:lnTo>
-                  <a:pt x="2506138" y="0"/>
-                </a:lnTo>
-                <a:lnTo>
-                  <a:pt x="0" y="0"/>
-                </a:lnTo>
-                <a:close/>
-              </a:path>
-            </a:pathLst>
-          </a:custGeom>
+          </a:prstGeom>
           <a:solidFill>
-            <a:schemeClr val="bg1">
-              <a:lumMod val="85000"/>
-              <a:lumOff val="15000"/>
-              <a:alpha val="70000"/>
-            </a:schemeClr>
+            <a:srgbClr val="000000"/>
           </a:solidFill>
           <a:ln>
             <a:noFill/>
@@ -9270,143 +9800,115 @@
           </a:fontRef>
         </p:style>
         <p:txBody>
-          <a:bodyPr wrap="square" rtlCol="0" anchor="ctr">
-            <a:noAutofit/>
+          <a:bodyPr rtlCol="0" anchor="ctr"/>
+          <a:lstStyle/>
+          <a:p>
+            <a:pPr algn="ctr"/>
+            <a:endParaRPr lang="en-US"/>
+          </a:p>
+        </p:txBody>
+      </p:sp>
+      <p:pic>
+        <p:nvPicPr>
+          <p:cNvPr id="4" name="Picture 3">
+            <a:extLst>
+              <a:ext uri="{FF2B5EF4-FFF2-40B4-BE49-F238E27FC236}">
+                <a16:creationId xmlns:a16="http://schemas.microsoft.com/office/drawing/2014/main" id="{4B970404-0970-4E40-8E70-C98F6190B8F8}"/>
+              </a:ext>
+            </a:extLst>
+          </p:cNvPr>
+          <p:cNvPicPr>
+            <a:picLocks noChangeAspect="1"/>
+          </p:cNvPicPr>
+          <p:nvPr/>
+        </p:nvPicPr>
+        <p:blipFill rotWithShape="1">
+          <a:blip r:embed="rId3">
+            <a:alphaModFix amt="35000"/>
+          </a:blip>
+          <a:srcRect b="7787"/>
+          <a:stretch/>
+        </p:blipFill>
+        <p:spPr>
+          <a:xfrm>
+            <a:off x="-1" y="0"/>
+            <a:ext cx="12191980" cy="6857990"/>
+          </a:xfrm>
+          <a:prstGeom prst="rect">
+            <a:avLst/>
+          </a:prstGeom>
+          <a:noFill/>
+        </p:spPr>
+      </p:pic>
+      <p:sp>
+        <p:nvSpPr>
+          <p:cNvPr id="12" name="TextBox 11">
+            <a:extLst>
+              <a:ext uri="{FF2B5EF4-FFF2-40B4-BE49-F238E27FC236}">
+                <a16:creationId xmlns:a16="http://schemas.microsoft.com/office/drawing/2014/main" id="{8C47248D-2004-49B2-B588-B77BBA573ED9}"/>
+              </a:ext>
+            </a:extLst>
+          </p:cNvPr>
+          <p:cNvSpPr txBox="1"/>
+          <p:nvPr/>
+        </p:nvSpPr>
+        <p:spPr>
+          <a:xfrm>
+            <a:off x="1300908" y="217316"/>
+            <a:ext cx="6174954" cy="707886"/>
+          </a:xfrm>
+          <a:prstGeom prst="rect">
+            <a:avLst/>
+          </a:prstGeom>
+          <a:noFill/>
+        </p:spPr>
+        <p:txBody>
+          <a:bodyPr wrap="square">
+            <a:spAutoFit/>
           </a:bodyPr>
           <a:lstStyle/>
           <a:p>
-            <a:pPr marL="0" marR="0" lvl="0" indent="0" algn="ctr" defTabSz="914400" rtl="0" eaLnBrk="1" fontAlgn="auto" latinLnBrk="0" hangingPunct="1">
-              <a:lnSpc>
-                <a:spcPct val="100000"/>
-              </a:lnSpc>
-              <a:spcBef>
-                <a:spcPts val="0"/>
-              </a:spcBef>
-              <a:spcAft>
-                <a:spcPts val="0"/>
-              </a:spcAft>
-              <a:buClrTx/>
-              <a:buSzTx/>
-              <a:buFontTx/>
-              <a:buNone/>
-              <a:tabLst/>
-              <a:defRPr/>
-            </a:pPr>
-            <a:endParaRPr kumimoji="0" lang="en-US" sz="1800" b="0" i="0" u="none" strike="noStrike" kern="1200" cap="none" spc="0" normalizeH="0" baseline="0" noProof="0">
-              <a:ln>
-                <a:noFill/>
-              </a:ln>
-              <a:solidFill>
-                <a:prstClr val="white"/>
-              </a:solidFill>
-              <a:effectLst/>
-              <a:uLnTx/>
-              <a:uFillTx/>
-              <a:latin typeface="Calibri" panose="020F0502020204030204"/>
-              <a:ea typeface="+mn-ea"/>
-              <a:cs typeface="+mn-cs"/>
-            </a:endParaRPr>
-          </a:p>
-        </p:txBody>
-      </p:sp>
-      <p:sp>
-        <p:nvSpPr>
-          <p:cNvPr id="49" name="Freeform: Shape 48">
-            <a:extLst>
-              <a:ext uri="{FF2B5EF4-FFF2-40B4-BE49-F238E27FC236}">
-                <a16:creationId xmlns:a16="http://schemas.microsoft.com/office/drawing/2014/main" id="{240E5BD2-4019-4012-A1AA-628900E659E9}"/>
-              </a:ext>
-              <a:ext uri="{C183D7F6-B498-43B3-948B-1728B52AA6E4}">
-                <adec:decorative xmlns:adec="http://schemas.microsoft.com/office/drawing/2017/decorative" val="1"/>
-              </a:ext>
-            </a:extLst>
-          </p:cNvPr>
-          <p:cNvSpPr>
-            <a:spLocks noGrp="1" noRot="1" noChangeAspect="1" noMove="1" noResize="1" noEditPoints="1" noAdjustHandles="1" noChangeArrowheads="1" noChangeShapeType="1" noTextEdit="1"/>
-          </p:cNvSpPr>
-          <p:nvPr>
-            <p:extLst>
-              <p:ext uri="{386F3935-93C4-4BCD-93E2-E3B085C9AB24}">
-                <p16:designElem xmlns:p16="http://schemas.microsoft.com/office/powerpoint/2015/main" val="1"/>
-              </p:ext>
-            </p:extLst>
-          </p:nvPr>
+            <a:r>
+              <a:rPr lang="en-US" sz="4000" dirty="0">
+                <a:latin typeface="Arial" panose="020B0604020202020204" pitchFamily="34" charset="0"/>
+                <a:cs typeface="Arial" panose="020B0604020202020204" pitchFamily="34" charset="0"/>
+              </a:rPr>
+              <a:t>Live! Price Prediction </a:t>
+            </a:r>
+          </a:p>
+        </p:txBody>
+      </p:sp>
+      <p:sp>
+        <p:nvSpPr>
+          <p:cNvPr id="8" name="Rectangle: Single Corner Snipped 7">
+            <a:extLst>
+              <a:ext uri="{FF2B5EF4-FFF2-40B4-BE49-F238E27FC236}">
+                <a16:creationId xmlns:a16="http://schemas.microsoft.com/office/drawing/2014/main" id="{C3AE583F-0981-493C-AC9A-91BB05F9C1D5}"/>
+              </a:ext>
+            </a:extLst>
+          </p:cNvPr>
+          <p:cNvSpPr/>
+          <p:nvPr/>
         </p:nvSpPr>
         <p:spPr>
-          <a:xfrm flipV="1">
-            <a:off x="1" y="-478"/>
-            <a:ext cx="5953780" cy="6858478"/>
-          </a:xfrm>
-          <a:custGeom>
+          <a:xfrm>
+            <a:off x="1186665" y="1142512"/>
+            <a:ext cx="9818648" cy="5498166"/>
+          </a:xfrm>
+          <a:prstGeom prst="snip1Rect">
             <a:avLst/>
-            <a:gdLst>
-              <a:gd name="connsiteX0" fmla="*/ 0 w 5953780"/>
-              <a:gd name="connsiteY0" fmla="*/ 6858478 h 6858478"/>
-              <a:gd name="connsiteX1" fmla="*/ 5953780 w 5953780"/>
-              <a:gd name="connsiteY1" fmla="*/ 6858478 h 6858478"/>
-              <a:gd name="connsiteX2" fmla="*/ 2777405 w 5953780"/>
-              <a:gd name="connsiteY2" fmla="*/ 0 h 6858478"/>
-              <a:gd name="connsiteX3" fmla="*/ 2771828 w 5953780"/>
-              <a:gd name="connsiteY3" fmla="*/ 0 h 6858478"/>
-              <a:gd name="connsiteX4" fmla="*/ 1705600 w 5953780"/>
-              <a:gd name="connsiteY4" fmla="*/ 0 h 6858478"/>
-              <a:gd name="connsiteX5" fmla="*/ 0 w 5953780"/>
-              <a:gd name="connsiteY5" fmla="*/ 0 h 6858478"/>
-            </a:gdLst>
-            <a:ahLst/>
-            <a:cxnLst>
-              <a:cxn ang="0">
-                <a:pos x="connsiteX0" y="connsiteY0"/>
-              </a:cxn>
-              <a:cxn ang="0">
-                <a:pos x="connsiteX1" y="connsiteY1"/>
-              </a:cxn>
-              <a:cxn ang="0">
-                <a:pos x="connsiteX2" y="connsiteY2"/>
-              </a:cxn>
-              <a:cxn ang="0">
-                <a:pos x="connsiteX3" y="connsiteY3"/>
-              </a:cxn>
-              <a:cxn ang="0">
-                <a:pos x="connsiteX4" y="connsiteY4"/>
-              </a:cxn>
-              <a:cxn ang="0">
-                <a:pos x="connsiteX5" y="connsiteY5"/>
-              </a:cxn>
-            </a:cxnLst>
-            <a:rect l="l" t="t" r="r" b="b"/>
-            <a:pathLst>
-              <a:path w="5953780" h="6858478">
-                <a:moveTo>
-                  <a:pt x="0" y="6858478"/>
-                </a:moveTo>
-                <a:lnTo>
-                  <a:pt x="5953780" y="6858478"/>
-                </a:lnTo>
-                <a:lnTo>
-                  <a:pt x="2777405" y="0"/>
-                </a:lnTo>
-                <a:lnTo>
-                  <a:pt x="2771828" y="0"/>
-                </a:lnTo>
-                <a:lnTo>
-                  <a:pt x="1705600" y="0"/>
-                </a:lnTo>
-                <a:lnTo>
-                  <a:pt x="0" y="0"/>
-                </a:lnTo>
-                <a:close/>
-              </a:path>
-            </a:pathLst>
-          </a:custGeom>
+          </a:prstGeom>
           <a:solidFill>
-            <a:schemeClr val="bg1">
-              <a:lumMod val="85000"/>
-              <a:lumOff val="15000"/>
-            </a:schemeClr>
+            <a:srgbClr val="D9D9D9">
+              <a:alpha val="85098"/>
+            </a:srgbClr>
           </a:solidFill>
           <a:ln>
-            <a:noFill/>
+            <a:solidFill>
+              <a:srgbClr val="A5A5A5">
+                <a:alpha val="85098"/>
+              </a:srgbClr>
+            </a:solidFill>
           </a:ln>
         </p:spPr>
         <p:style>
@@ -9426,201 +9928,442 @@
           </a:fontRef>
         </p:style>
         <p:txBody>
-          <a:bodyPr wrap="square" rtlCol="0" anchor="ctr">
-            <a:noAutofit/>
-          </a:bodyPr>
+          <a:bodyPr rtlCol="0" anchor="ctr"/>
           <a:lstStyle/>
           <a:p>
-            <a:pPr marL="0" marR="0" lvl="0" indent="0" algn="ctr" defTabSz="914400" rtl="0" eaLnBrk="1" fontAlgn="auto" latinLnBrk="0" hangingPunct="1">
-              <a:lnSpc>
-                <a:spcPct val="100000"/>
-              </a:lnSpc>
-              <a:spcBef>
-                <a:spcPts val="0"/>
-              </a:spcBef>
-              <a:spcAft>
-                <a:spcPts val="0"/>
-              </a:spcAft>
-              <a:buClrTx/>
-              <a:buSzTx/>
-              <a:buFontTx/>
-              <a:buNone/>
-              <a:tabLst/>
-              <a:defRPr/>
-            </a:pPr>
-            <a:endParaRPr kumimoji="0" lang="en-US" sz="1800" b="0" i="0" u="none" strike="noStrike" kern="1200" cap="none" spc="0" normalizeH="0" baseline="0" noProof="0">
-              <a:ln>
-                <a:noFill/>
-              </a:ln>
-              <a:solidFill>
-                <a:prstClr val="white"/>
-              </a:solidFill>
-              <a:effectLst/>
-              <a:uLnTx/>
-              <a:uFillTx/>
-              <a:latin typeface="Calibri" panose="020F0502020204030204"/>
-              <a:ea typeface="+mn-ea"/>
-              <a:cs typeface="+mn-cs"/>
-            </a:endParaRPr>
-          </a:p>
-        </p:txBody>
-      </p:sp>
-      <p:sp>
-        <p:nvSpPr>
-          <p:cNvPr id="5" name="Title 4">
-            <a:extLst>
-              <a:ext uri="{FF2B5EF4-FFF2-40B4-BE49-F238E27FC236}">
-                <a16:creationId xmlns:a16="http://schemas.microsoft.com/office/drawing/2014/main" id="{7BCFFD7F-EA8C-4208-8932-DC9E8F1DD44D}"/>
-              </a:ext>
-            </a:extLst>
-          </p:cNvPr>
-          <p:cNvSpPr>
-            <a:spLocks noGrp="1"/>
-          </p:cNvSpPr>
-          <p:nvPr>
-            <p:ph type="title"/>
-          </p:nvPr>
-        </p:nvSpPr>
-        <p:spPr>
-          <a:xfrm>
-            <a:off x="804672" y="342006"/>
-            <a:ext cx="3879232" cy="2248122"/>
-          </a:xfrm>
-        </p:spPr>
-        <p:txBody>
-          <a:bodyPr vert="horz" lIns="91440" tIns="45720" rIns="91440" bIns="45720" rtlCol="0" anchor="b">
-            <a:normAutofit/>
-          </a:bodyPr>
-          <a:lstStyle/>
-          <a:p>
-            <a:r>
-              <a:rPr lang="en-US" sz="5400" b="1" dirty="0"/>
-              <a:t>Thank You!</a:t>
-            </a:r>
-          </a:p>
-        </p:txBody>
-      </p:sp>
-      <p:sp>
-        <p:nvSpPr>
-          <p:cNvPr id="3" name="Text Placeholder 2">
-            <a:extLst>
-              <a:ext uri="{FF2B5EF4-FFF2-40B4-BE49-F238E27FC236}">
-                <a16:creationId xmlns:a16="http://schemas.microsoft.com/office/drawing/2014/main" id="{CD9A2A57-4007-41B1-9BB7-1A54BBFF536A}"/>
-              </a:ext>
-            </a:extLst>
-          </p:cNvPr>
-          <p:cNvSpPr>
-            <a:spLocks noGrp="1"/>
-          </p:cNvSpPr>
-          <p:nvPr>
-            <p:ph type="body" idx="1"/>
-          </p:nvPr>
-        </p:nvSpPr>
-        <p:spPr>
-          <a:xfrm>
-            <a:off x="804672" y="2726652"/>
-            <a:ext cx="3205463" cy="1155525"/>
-          </a:xfrm>
-        </p:spPr>
-        <p:txBody>
-          <a:bodyPr vert="horz" lIns="91440" tIns="45720" rIns="91440" bIns="45720" rtlCol="0" anchor="t">
-            <a:normAutofit/>
-          </a:bodyPr>
-          <a:lstStyle/>
-          <a:p>
-            <a:r>
-              <a:rPr lang="en-US" sz="2000">
-                <a:solidFill>
-                  <a:schemeClr val="tx1"/>
-                </a:solidFill>
-              </a:rPr>
-              <a:t>Q &amp; A</a:t>
-            </a:r>
+            <a:pPr algn="ctr"/>
+            <a:endParaRPr lang="en-US"/>
           </a:p>
         </p:txBody>
       </p:sp>
       <p:cxnSp>
         <p:nvCxnSpPr>
-          <p:cNvPr id="8" name="Straight Connector 7">
-            <a:extLst>
-              <a:ext uri="{FF2B5EF4-FFF2-40B4-BE49-F238E27FC236}">
-                <a16:creationId xmlns:a16="http://schemas.microsoft.com/office/drawing/2014/main" id="{365706AE-0F48-4687-B860-1AD7CA9D68FD}"/>
-              </a:ext>
-            </a:extLst>
-          </p:cNvPr>
-          <p:cNvCxnSpPr/>
+          <p:cNvPr id="33" name="Straight Connector 32">
+            <a:extLst>
+              <a:ext uri="{FF2B5EF4-FFF2-40B4-BE49-F238E27FC236}">
+                <a16:creationId xmlns:a16="http://schemas.microsoft.com/office/drawing/2014/main" id="{7FC2B51D-1C2D-4C73-B652-558BFFD96D47}"/>
+              </a:ext>
+            </a:extLst>
+          </p:cNvPr>
+          <p:cNvCxnSpPr>
+            <a:cxnSpLocks/>
+          </p:cNvCxnSpPr>
           <p:nvPr/>
         </p:nvCxnSpPr>
         <p:spPr>
-          <a:xfrm flipH="1">
-            <a:off x="2756647" y="-478"/>
-            <a:ext cx="3197134" cy="6858478"/>
+          <a:xfrm>
+            <a:off x="1443461" y="925202"/>
+            <a:ext cx="2524836" cy="0"/>
           </a:xfrm>
           <a:prstGeom prst="line">
             <a:avLst/>
           </a:prstGeom>
-          <a:ln>
+          <a:ln w="25400" cmpd="sng">
             <a:solidFill>
-              <a:srgbClr val="FF0000"/>
+              <a:srgbClr val="EB0A1E"/>
             </a:solidFill>
           </a:ln>
         </p:spPr>
         <p:style>
-          <a:lnRef idx="1">
-            <a:schemeClr val="accent1"/>
+          <a:lnRef idx="3">
+            <a:schemeClr val="accent2"/>
           </a:lnRef>
           <a:fillRef idx="0">
-            <a:schemeClr val="accent1"/>
+            <a:schemeClr val="accent2"/>
           </a:fillRef>
-          <a:effectRef idx="0">
-            <a:schemeClr val="accent1"/>
+          <a:effectRef idx="2">
+            <a:schemeClr val="accent2"/>
           </a:effectRef>
           <a:fontRef idx="minor">
             <a:schemeClr val="tx1"/>
           </a:fontRef>
         </p:style>
       </p:cxnSp>
-      <p:cxnSp>
-        <p:nvCxnSpPr>
-          <p:cNvPr id="25" name="Straight Connector 24">
-            <a:extLst>
-              <a:ext uri="{FF2B5EF4-FFF2-40B4-BE49-F238E27FC236}">
-                <a16:creationId xmlns:a16="http://schemas.microsoft.com/office/drawing/2014/main" id="{1164EF5C-B64D-46E7-BE6C-55DD7627DFE2}"/>
-              </a:ext>
-            </a:extLst>
-          </p:cNvPr>
-          <p:cNvCxnSpPr/>
+      <p:sp>
+        <p:nvSpPr>
+          <p:cNvPr id="11" name="TextBox 10">
+            <a:extLst>
+              <a:ext uri="{FF2B5EF4-FFF2-40B4-BE49-F238E27FC236}">
+                <a16:creationId xmlns:a16="http://schemas.microsoft.com/office/drawing/2014/main" id="{39562465-37BA-442A-B4EA-0E8DF432585E}"/>
+              </a:ext>
+            </a:extLst>
+          </p:cNvPr>
+          <p:cNvSpPr txBox="1"/>
           <p:nvPr/>
-        </p:nvCxnSpPr>
+        </p:nvSpPr>
         <p:spPr>
-          <a:xfrm flipH="1">
-            <a:off x="3557184" y="0"/>
-            <a:ext cx="3197134" cy="6858478"/>
-          </a:xfrm>
-          <a:prstGeom prst="line">
+          <a:xfrm>
+            <a:off x="2421454" y="1437998"/>
+            <a:ext cx="7349067" cy="954107"/>
+          </a:xfrm>
+          <a:prstGeom prst="rect">
             <a:avLst/>
           </a:prstGeom>
-          <a:ln/>
+          <a:noFill/>
         </p:spPr>
-        <p:style>
-          <a:lnRef idx="1">
-            <a:schemeClr val="accent1"/>
-          </a:lnRef>
-          <a:fillRef idx="0">
-            <a:schemeClr val="accent1"/>
-          </a:fillRef>
-          <a:effectRef idx="0">
-            <a:schemeClr val="accent1"/>
-          </a:effectRef>
-          <a:fontRef idx="minor">
-            <a:schemeClr val="tx1"/>
-          </a:fontRef>
-        </p:style>
-      </p:cxnSp>
+        <p:txBody>
+          <a:bodyPr wrap="square" rtlCol="0">
+            <a:spAutoFit/>
+          </a:bodyPr>
+          <a:lstStyle/>
+          <a:p>
+            <a:pPr algn="ctr"/>
+            <a:r>
+              <a:rPr lang="en-US" sz="2800" b="1" dirty="0">
+                <a:solidFill>
+                  <a:srgbClr val="2A6BAC"/>
+                </a:solidFill>
+                <a:latin typeface="Arial" panose="020B0604020202020204" pitchFamily="34" charset="0"/>
+                <a:cs typeface="Arial" panose="020B0604020202020204" pitchFamily="34" charset="0"/>
+              </a:rPr>
+              <a:t>Models: </a:t>
+            </a:r>
+          </a:p>
+          <a:p>
+            <a:pPr algn="ctr"/>
+            <a:r>
+              <a:rPr lang="en-US" sz="2800" b="1" dirty="0">
+                <a:solidFill>
+                  <a:schemeClr val="bg1"/>
+                </a:solidFill>
+                <a:latin typeface="Arial" panose="020B0604020202020204" pitchFamily="34" charset="0"/>
+                <a:cs typeface="Arial" panose="020B0604020202020204" pitchFamily="34" charset="0"/>
+              </a:rPr>
+              <a:t>Fiesta • Focus • Aygo • Aygo</a:t>
+            </a:r>
+            <a:r>
+              <a:rPr lang="en-US" sz="2800" b="1" dirty="0">
+                <a:solidFill>
+                  <a:srgbClr val="2A6BAC"/>
+                </a:solidFill>
+                <a:latin typeface="Arial" panose="020B0604020202020204" pitchFamily="34" charset="0"/>
+                <a:cs typeface="Arial" panose="020B0604020202020204" pitchFamily="34" charset="0"/>
+              </a:rPr>
+              <a:t>  </a:t>
+            </a:r>
+          </a:p>
+        </p:txBody>
+      </p:sp>
+      <p:sp>
+        <p:nvSpPr>
+          <p:cNvPr id="13" name="TextBox 12">
+            <a:extLst>
+              <a:ext uri="{FF2B5EF4-FFF2-40B4-BE49-F238E27FC236}">
+                <a16:creationId xmlns:a16="http://schemas.microsoft.com/office/drawing/2014/main" id="{BE887684-78B3-4AEF-B4B9-3C910D4DC3A8}"/>
+              </a:ext>
+            </a:extLst>
+          </p:cNvPr>
+          <p:cNvSpPr txBox="1"/>
+          <p:nvPr/>
+        </p:nvSpPr>
+        <p:spPr>
+          <a:xfrm>
+            <a:off x="1596691" y="3428994"/>
+            <a:ext cx="2427112" cy="830997"/>
+          </a:xfrm>
+          <a:prstGeom prst="rect">
+            <a:avLst/>
+          </a:prstGeom>
+          <a:noFill/>
+        </p:spPr>
+        <p:txBody>
+          <a:bodyPr wrap="square" rtlCol="0">
+            <a:spAutoFit/>
+          </a:bodyPr>
+          <a:lstStyle/>
+          <a:p>
+            <a:pPr algn="ctr"/>
+            <a:r>
+              <a:rPr lang="en-US" sz="2400" b="1" dirty="0">
+                <a:solidFill>
+                  <a:srgbClr val="2A6BAC"/>
+                </a:solidFill>
+              </a:rPr>
+              <a:t>Mileage:</a:t>
+            </a:r>
+          </a:p>
+          <a:p>
+            <a:pPr algn="ctr"/>
+            <a:r>
+              <a:rPr lang="en-US" sz="2400" b="1" dirty="0">
+                <a:solidFill>
+                  <a:schemeClr val="bg1"/>
+                </a:solidFill>
+              </a:rPr>
+              <a:t>3,000 to 9,000</a:t>
+            </a:r>
+          </a:p>
+        </p:txBody>
+      </p:sp>
+      <p:sp>
+        <p:nvSpPr>
+          <p:cNvPr id="37" name="TextBox 36">
+            <a:extLst>
+              <a:ext uri="{FF2B5EF4-FFF2-40B4-BE49-F238E27FC236}">
+                <a16:creationId xmlns:a16="http://schemas.microsoft.com/office/drawing/2014/main" id="{A53CF59F-7139-44B7-A404-AD9F37E4D3B1}"/>
+              </a:ext>
+            </a:extLst>
+          </p:cNvPr>
+          <p:cNvSpPr txBox="1"/>
+          <p:nvPr/>
+        </p:nvSpPr>
+        <p:spPr>
+          <a:xfrm>
+            <a:off x="5132942" y="3438207"/>
+            <a:ext cx="1926089" cy="1046440"/>
+          </a:xfrm>
+          <a:prstGeom prst="rect">
+            <a:avLst/>
+          </a:prstGeom>
+          <a:noFill/>
+        </p:spPr>
+        <p:txBody>
+          <a:bodyPr wrap="square" rtlCol="0">
+            <a:spAutoFit/>
+          </a:bodyPr>
+          <a:lstStyle/>
+          <a:p>
+            <a:pPr algn="ctr"/>
+            <a:r>
+              <a:rPr lang="en-US" sz="2400" b="1" dirty="0">
+                <a:solidFill>
+                  <a:srgbClr val="2A6BAC"/>
+                </a:solidFill>
+              </a:rPr>
+              <a:t>MPG:</a:t>
+            </a:r>
+          </a:p>
+          <a:p>
+            <a:pPr algn="ctr"/>
+            <a:r>
+              <a:rPr lang="en-US" sz="2400" b="1" dirty="0">
+                <a:solidFill>
+                  <a:schemeClr val="bg1"/>
+                </a:solidFill>
+              </a:rPr>
+              <a:t>55 to 65</a:t>
+            </a:r>
+          </a:p>
+          <a:p>
+            <a:pPr algn="ctr"/>
+            <a:r>
+              <a:rPr lang="en-US" sz="1400" b="1" dirty="0">
+                <a:solidFill>
+                  <a:schemeClr val="bg1"/>
+                </a:solidFill>
+              </a:rPr>
+              <a:t>(whole numbers only)</a:t>
+            </a:r>
+          </a:p>
+        </p:txBody>
+      </p:sp>
+      <p:sp>
+        <p:nvSpPr>
+          <p:cNvPr id="38" name="TextBox 37">
+            <a:extLst>
+              <a:ext uri="{FF2B5EF4-FFF2-40B4-BE49-F238E27FC236}">
+                <a16:creationId xmlns:a16="http://schemas.microsoft.com/office/drawing/2014/main" id="{DE7596DC-F3E7-4DF9-9B78-351C1C04D17A}"/>
+              </a:ext>
+            </a:extLst>
+          </p:cNvPr>
+          <p:cNvSpPr txBox="1"/>
+          <p:nvPr/>
+        </p:nvSpPr>
+        <p:spPr>
+          <a:xfrm>
+            <a:off x="8168170" y="3429790"/>
+            <a:ext cx="1926089" cy="830997"/>
+          </a:xfrm>
+          <a:prstGeom prst="rect">
+            <a:avLst/>
+          </a:prstGeom>
+          <a:noFill/>
+        </p:spPr>
+        <p:txBody>
+          <a:bodyPr wrap="square" rtlCol="0">
+            <a:spAutoFit/>
+          </a:bodyPr>
+          <a:lstStyle/>
+          <a:p>
+            <a:pPr algn="ctr"/>
+            <a:r>
+              <a:rPr lang="en-US" sz="2400" b="1" dirty="0">
+                <a:solidFill>
+                  <a:srgbClr val="2A6BAC"/>
+                </a:solidFill>
+              </a:rPr>
+              <a:t>Engine Size:</a:t>
+            </a:r>
+          </a:p>
+          <a:p>
+            <a:pPr algn="ctr"/>
+            <a:r>
+              <a:rPr lang="en-US" sz="2400" b="1" dirty="0">
+                <a:solidFill>
+                  <a:schemeClr val="bg1"/>
+                </a:solidFill>
+              </a:rPr>
+              <a:t>1 to 1.5</a:t>
+            </a:r>
+          </a:p>
+        </p:txBody>
+      </p:sp>
+      <p:sp>
+        <p:nvSpPr>
+          <p:cNvPr id="17" name="TextBox 16">
+            <a:extLst>
+              <a:ext uri="{FF2B5EF4-FFF2-40B4-BE49-F238E27FC236}">
+                <a16:creationId xmlns:a16="http://schemas.microsoft.com/office/drawing/2014/main" id="{D7764713-078C-45E2-BC18-17F90D46B202}"/>
+              </a:ext>
+            </a:extLst>
+          </p:cNvPr>
+          <p:cNvSpPr txBox="1"/>
+          <p:nvPr/>
+        </p:nvSpPr>
+        <p:spPr>
+          <a:xfrm>
+            <a:off x="1443461" y="5701485"/>
+            <a:ext cx="9561832" cy="923330"/>
+          </a:xfrm>
+          <a:prstGeom prst="rect">
+            <a:avLst/>
+          </a:prstGeom>
+          <a:noFill/>
+        </p:spPr>
+        <p:txBody>
+          <a:bodyPr wrap="square" rtlCol="0">
+            <a:spAutoFit/>
+          </a:bodyPr>
+          <a:lstStyle/>
+          <a:p>
+            <a:r>
+              <a:rPr lang="en-US" dirty="0"/>
+              <a:t>Disclaimer: Price prediction does not consider, year of used car, damage of used car, fuel type, transmission type or emotional attachment to used car. Model should be used purely as estimate and not fact. </a:t>
+            </a:r>
+          </a:p>
+        </p:txBody>
+      </p:sp>
+      <p:pic>
+        <p:nvPicPr>
+          <p:cNvPr id="21" name="Graphic 20" descr="Car Mechanic with solid fill">
+            <a:extLst>
+              <a:ext uri="{FF2B5EF4-FFF2-40B4-BE49-F238E27FC236}">
+                <a16:creationId xmlns:a16="http://schemas.microsoft.com/office/drawing/2014/main" id="{E5274689-2D31-4836-BB51-85A86F38C326}"/>
+              </a:ext>
+            </a:extLst>
+          </p:cNvPr>
+          <p:cNvPicPr>
+            <a:picLocks noChangeAspect="1"/>
+          </p:cNvPicPr>
+          <p:nvPr/>
+        </p:nvPicPr>
+        <p:blipFill>
+          <a:blip r:embed="rId4">
+            <a:extLst>
+              <a:ext uri="{28A0092B-C50C-407E-A947-70E740481C1C}">
+                <a14:useLocalDpi xmlns:a14="http://schemas.microsoft.com/office/drawing/2010/main" val="0"/>
+              </a:ext>
+              <a:ext uri="{96DAC541-7B7A-43D3-8B79-37D633B846F1}">
+                <asvg:svgBlip xmlns:asvg="http://schemas.microsoft.com/office/drawing/2016/SVG/main" r:embed="rId5"/>
+              </a:ext>
+            </a:extLst>
+          </a:blip>
+          <a:stretch>
+            <a:fillRect/>
+          </a:stretch>
+        </p:blipFill>
+        <p:spPr>
+          <a:xfrm>
+            <a:off x="8810428" y="2782957"/>
+            <a:ext cx="640080" cy="640080"/>
+          </a:xfrm>
+          <a:prstGeom prst="rect">
+            <a:avLst/>
+          </a:prstGeom>
+        </p:spPr>
+      </p:pic>
+      <p:pic>
+        <p:nvPicPr>
+          <p:cNvPr id="25" name="Graphic 24" descr="Fuel with solid fill">
+            <a:extLst>
+              <a:ext uri="{FF2B5EF4-FFF2-40B4-BE49-F238E27FC236}">
+                <a16:creationId xmlns:a16="http://schemas.microsoft.com/office/drawing/2014/main" id="{42D095AB-1CBD-465A-8259-82994F2C74C3}"/>
+              </a:ext>
+            </a:extLst>
+          </p:cNvPr>
+          <p:cNvPicPr>
+            <a:picLocks noChangeAspect="1"/>
+          </p:cNvPicPr>
+          <p:nvPr/>
+        </p:nvPicPr>
+        <p:blipFill>
+          <a:blip r:embed="rId6">
+            <a:extLst>
+              <a:ext uri="{28A0092B-C50C-407E-A947-70E740481C1C}">
+                <a14:useLocalDpi xmlns:a14="http://schemas.microsoft.com/office/drawing/2010/main" val="0"/>
+              </a:ext>
+              <a:ext uri="{96DAC541-7B7A-43D3-8B79-37D633B846F1}">
+                <asvg:svgBlip xmlns:asvg="http://schemas.microsoft.com/office/drawing/2016/SVG/main" r:embed="rId7"/>
+              </a:ext>
+            </a:extLst>
+          </a:blip>
+          <a:stretch>
+            <a:fillRect/>
+          </a:stretch>
+        </p:blipFill>
+        <p:spPr>
+          <a:xfrm>
+            <a:off x="5772492" y="2782957"/>
+            <a:ext cx="640080" cy="640080"/>
+          </a:xfrm>
+          <a:prstGeom prst="rect">
+            <a:avLst/>
+          </a:prstGeom>
+        </p:spPr>
+      </p:pic>
+      <p:pic>
+        <p:nvPicPr>
+          <p:cNvPr id="39" name="Graphic 38" descr="Race Flag with solid fill">
+            <a:extLst>
+              <a:ext uri="{FF2B5EF4-FFF2-40B4-BE49-F238E27FC236}">
+                <a16:creationId xmlns:a16="http://schemas.microsoft.com/office/drawing/2014/main" id="{3D650456-4CD3-4E3F-A22C-712C67D50520}"/>
+              </a:ext>
+            </a:extLst>
+          </p:cNvPr>
+          <p:cNvPicPr>
+            <a:picLocks noChangeAspect="1"/>
+          </p:cNvPicPr>
+          <p:nvPr/>
+        </p:nvPicPr>
+        <p:blipFill>
+          <a:blip r:embed="rId8">
+            <a:extLst>
+              <a:ext uri="{28A0092B-C50C-407E-A947-70E740481C1C}">
+                <a14:useLocalDpi xmlns:a14="http://schemas.microsoft.com/office/drawing/2010/main" val="0"/>
+              </a:ext>
+              <a:ext uri="{96DAC541-7B7A-43D3-8B79-37D633B846F1}">
+                <asvg:svgBlip xmlns:asvg="http://schemas.microsoft.com/office/drawing/2016/SVG/main" r:embed="rId9"/>
+              </a:ext>
+            </a:extLst>
+          </a:blip>
+          <a:stretch>
+            <a:fillRect/>
+          </a:stretch>
+        </p:blipFill>
+        <p:spPr>
+          <a:xfrm>
+            <a:off x="2421454" y="2782957"/>
+            <a:ext cx="640080" cy="640080"/>
+          </a:xfrm>
+          <a:prstGeom prst="rect">
+            <a:avLst/>
+          </a:prstGeom>
+        </p:spPr>
+      </p:pic>
     </p:spTree>
     <p:extLst>
       <p:ext uri="{BB962C8B-B14F-4D97-AF65-F5344CB8AC3E}">
-        <p14:creationId xmlns:p14="http://schemas.microsoft.com/office/powerpoint/2010/main" val="1499255396"/>
+        <p14:creationId xmlns:p14="http://schemas.microsoft.com/office/powerpoint/2010/main" val="2174150617"/>
       </p:ext>
     </p:extLst>
   </p:cSld>

</xml_diff>